<commit_message>
Exposed the Metropolis sampling tutorial to the website, updated the content.
</commit_message>
<xml_diff>
--- a/libra/tutorials/tutorial_metropolis/toc.pptx
+++ b/libra/tutorials/tutorial_metropolis/toc.pptx
@@ -4134,64 +4134,6 @@
           <a:chExt cx="0" cy="0"/>
         </a:xfrm>
       </p:grpSpPr>
-      <p:pic>
-        <p:nvPicPr>
-          <p:cNvPr id="4" name="Picture 3"/>
-          <p:cNvPicPr>
-            <a:picLocks noChangeAspect="1"/>
-          </p:cNvPicPr>
-          <p:nvPr/>
-        </p:nvPicPr>
-        <p:blipFill rotWithShape="1">
-          <a:blip r:embed="rId2">
-            <a:extLst>
-              <a:ext uri="{28A0092B-C50C-407E-A947-70E740481C1C}">
-                <a14:useLocalDpi xmlns:a14="http://schemas.microsoft.com/office/drawing/2010/main" val="0"/>
-              </a:ext>
-            </a:extLst>
-          </a:blip>
-          <a:srcRect l="27561" r="30736"/>
-          <a:stretch/>
-        </p:blipFill>
-        <p:spPr>
-          <a:xfrm>
-            <a:off x="0" y="1"/>
-            <a:ext cx="4631183" cy="5791200"/>
-          </a:xfrm>
-          <a:prstGeom prst="rect">
-            <a:avLst/>
-          </a:prstGeom>
-        </p:spPr>
-      </p:pic>
-      <p:pic>
-        <p:nvPicPr>
-          <p:cNvPr id="5" name="Picture 4"/>
-          <p:cNvPicPr>
-            <a:picLocks noChangeAspect="1"/>
-          </p:cNvPicPr>
-          <p:nvPr/>
-        </p:nvPicPr>
-        <p:blipFill rotWithShape="1">
-          <a:blip r:embed="rId3">
-            <a:extLst>
-              <a:ext uri="{28A0092B-C50C-407E-A947-70E740481C1C}">
-                <a14:useLocalDpi xmlns:a14="http://schemas.microsoft.com/office/drawing/2010/main" val="0"/>
-              </a:ext>
-            </a:extLst>
-          </a:blip>
-          <a:srcRect l="27561" r="30736"/>
-          <a:stretch/>
-        </p:blipFill>
-        <p:spPr>
-          <a:xfrm>
-            <a:off x="4512814" y="0"/>
-            <a:ext cx="4631185" cy="5791201"/>
-          </a:xfrm>
-          <a:prstGeom prst="rect">
-            <a:avLst/>
-          </a:prstGeom>
-        </p:spPr>
-      </p:pic>
       <p:sp>
         <p:nvSpPr>
           <p:cNvPr id="6" name="Down Arrow 5"/>
@@ -4200,7 +4142,7 @@
         </p:nvSpPr>
         <p:spPr>
           <a:xfrm rot="16200000">
-            <a:off x="4457700" y="2495549"/>
+            <a:off x="4057651" y="2362200"/>
             <a:ext cx="619125" cy="800100"/>
           </a:xfrm>
           <a:prstGeom prst="downArrow">
@@ -4243,8 +4185,8 @@
         </p:nvSpPr>
         <p:spPr>
           <a:xfrm>
-            <a:off x="1091111" y="5237204"/>
-            <a:ext cx="7080143" cy="1107996"/>
+            <a:off x="754320" y="5237204"/>
+            <a:ext cx="7753726" cy="1107996"/>
           </a:xfrm>
           <a:prstGeom prst="rect">
             <a:avLst/>
@@ -4263,7 +4205,7 @@
                   <a:srgbClr val="92D050"/>
                 </a:solidFill>
               </a:rPr>
-              <a:t>Lattice Monte Carlo</a:t>
+              <a:t>Metropolis Algorithm</a:t>
             </a:r>
             <a:endParaRPr lang="en-US" sz="6600" b="1" dirty="0">
               <a:solidFill>
@@ -4273,6 +4215,402 @@
           </a:p>
         </p:txBody>
       </p:sp>
+      <p:pic>
+        <p:nvPicPr>
+          <p:cNvPr id="8" name="Picture 7"/>
+          <p:cNvPicPr>
+            <a:picLocks noChangeAspect="1"/>
+          </p:cNvPicPr>
+          <p:nvPr/>
+        </p:nvPicPr>
+        <p:blipFill rotWithShape="1">
+          <a:blip r:embed="rId2">
+            <a:extLst>
+              <a:ext uri="{28A0092B-C50C-407E-A947-70E740481C1C}">
+                <a14:useLocalDpi xmlns:a14="http://schemas.microsoft.com/office/drawing/2010/main" val="0"/>
+              </a:ext>
+            </a:extLst>
+          </a:blip>
+          <a:srcRect l="20126" t="10834" r="6500" b="9166"/>
+          <a:stretch/>
+        </p:blipFill>
+        <p:spPr>
+          <a:xfrm>
+            <a:off x="5072064" y="676275"/>
+            <a:ext cx="3509962" cy="3924300"/>
+          </a:xfrm>
+          <a:prstGeom prst="rect">
+            <a:avLst/>
+          </a:prstGeom>
+        </p:spPr>
+      </p:pic>
+      <mc:AlternateContent xmlns:mc="http://schemas.openxmlformats.org/markup-compatibility/2006">
+        <mc:Choice xmlns:a14="http://schemas.microsoft.com/office/drawing/2010/main" Requires="a14">
+          <p:sp>
+            <p:nvSpPr>
+              <p:cNvPr id="9" name="TextBox 8"/>
+              <p:cNvSpPr txBox="1"/>
+              <p:nvPr/>
+            </p:nvSpPr>
+            <p:spPr>
+              <a:xfrm>
+                <a:off x="554295" y="1581498"/>
+                <a:ext cx="3057440" cy="721801"/>
+              </a:xfrm>
+              <a:prstGeom prst="rect">
+                <a:avLst/>
+              </a:prstGeom>
+              <a:noFill/>
+            </p:spPr>
+            <p:txBody>
+              <a:bodyPr wrap="none" rtlCol="0">
+                <a:spAutoFit/>
+              </a:bodyPr>
+              <a:lstStyle/>
+              <a:p>
+                <a14:m>
+                  <m:oMathPara xmlns:m="http://schemas.openxmlformats.org/officeDocument/2006/math">
+                    <m:oMathParaPr>
+                      <m:jc m:val="centerGroup"/>
+                    </m:oMathParaPr>
+                    <m:oMath xmlns:m="http://schemas.openxmlformats.org/officeDocument/2006/math">
+                      <m:r>
+                        <a:rPr lang="en-US" sz="4000" b="1" i="1" smtClean="0">
+                          <a:solidFill>
+                            <a:srgbClr val="92D050"/>
+                          </a:solidFill>
+                          <a:latin typeface="Cambria Math" panose="02040503050406030204" pitchFamily="18" charset="0"/>
+                        </a:rPr>
+                        <m:t>𝑷</m:t>
+                      </m:r>
+                      <m:d>
+                        <m:dPr>
+                          <m:ctrlPr>
+                            <a:rPr lang="en-US" sz="4000" b="1" i="1" smtClean="0">
+                              <a:solidFill>
+                                <a:srgbClr val="92D050"/>
+                              </a:solidFill>
+                              <a:latin typeface="Cambria Math" panose="02040503050406030204" pitchFamily="18" charset="0"/>
+                            </a:rPr>
+                          </m:ctrlPr>
+                        </m:dPr>
+                        <m:e>
+                          <m:r>
+                            <a:rPr lang="en-US" sz="4000" b="1" i="1" smtClean="0">
+                              <a:solidFill>
+                                <a:srgbClr val="92D050"/>
+                              </a:solidFill>
+                              <a:latin typeface="Cambria Math" panose="02040503050406030204" pitchFamily="18" charset="0"/>
+                            </a:rPr>
+                            <m:t>𝒒</m:t>
+                          </m:r>
+                        </m:e>
+                      </m:d>
+                      <m:r>
+                        <a:rPr lang="en-US" sz="4000" b="1" i="1" smtClean="0">
+                          <a:solidFill>
+                            <a:srgbClr val="92D050"/>
+                          </a:solidFill>
+                          <a:latin typeface="Cambria Math" panose="02040503050406030204" pitchFamily="18" charset="0"/>
+                        </a:rPr>
+                        <m:t>=</m:t>
+                      </m:r>
+                      <m:sSup>
+                        <m:sSupPr>
+                          <m:ctrlPr>
+                            <a:rPr lang="en-US" sz="4000" b="1" i="1" smtClean="0">
+                              <a:solidFill>
+                                <a:srgbClr val="92D050"/>
+                              </a:solidFill>
+                              <a:latin typeface="Cambria Math" panose="02040503050406030204" pitchFamily="18" charset="0"/>
+                            </a:rPr>
+                          </m:ctrlPr>
+                        </m:sSupPr>
+                        <m:e>
+                          <m:d>
+                            <m:dPr>
+                              <m:begChr m:val="|"/>
+                              <m:endChr m:val="|"/>
+                              <m:ctrlPr>
+                                <a:rPr lang="en-US" sz="4000" b="1" i="1" smtClean="0">
+                                  <a:solidFill>
+                                    <a:srgbClr val="92D050"/>
+                                  </a:solidFill>
+                                  <a:latin typeface="Cambria Math" panose="02040503050406030204" pitchFamily="18" charset="0"/>
+                                </a:rPr>
+                              </m:ctrlPr>
+                            </m:dPr>
+                            <m:e>
+                              <m:r>
+                                <a:rPr lang="en-US" sz="4000" b="1" i="0" smtClean="0">
+                                  <a:solidFill>
+                                    <a:srgbClr val="92D050"/>
+                                  </a:solidFill>
+                                  <a:latin typeface="Cambria Math" panose="02040503050406030204" pitchFamily="18" charset="0"/>
+                                </a:rPr>
+                                <m:t>𝚿</m:t>
+                              </m:r>
+                            </m:e>
+                          </m:d>
+                        </m:e>
+                        <m:sup>
+                          <m:r>
+                            <a:rPr lang="en-US" sz="4000" b="1" i="1" smtClean="0">
+                              <a:solidFill>
+                                <a:srgbClr val="92D050"/>
+                              </a:solidFill>
+                              <a:latin typeface="Cambria Math" panose="02040503050406030204" pitchFamily="18" charset="0"/>
+                            </a:rPr>
+                            <m:t>𝟐</m:t>
+                          </m:r>
+                        </m:sup>
+                      </m:sSup>
+                    </m:oMath>
+                  </m:oMathPara>
+                </a14:m>
+                <a:endParaRPr lang="en-US" sz="4000" b="1" dirty="0">
+                  <a:solidFill>
+                    <a:srgbClr val="92D050"/>
+                  </a:solidFill>
+                </a:endParaRPr>
+              </a:p>
+            </p:txBody>
+          </p:sp>
+        </mc:Choice>
+        <mc:Fallback>
+          <p:sp>
+            <p:nvSpPr>
+              <p:cNvPr id="9" name="TextBox 8"/>
+              <p:cNvSpPr txBox="1">
+                <a:spLocks noRot="1" noChangeAspect="1" noMove="1" noResize="1" noEditPoints="1" noAdjustHandles="1" noChangeArrowheads="1" noChangeShapeType="1" noTextEdit="1"/>
+              </p:cNvSpPr>
+              <p:nvPr/>
+            </p:nvSpPr>
+            <p:spPr>
+              <a:xfrm>
+                <a:off x="554295" y="1581498"/>
+                <a:ext cx="3057440" cy="721801"/>
+              </a:xfrm>
+              <a:prstGeom prst="rect">
+                <a:avLst/>
+              </a:prstGeom>
+              <a:blipFill>
+                <a:blip r:embed="rId3"/>
+                <a:stretch>
+                  <a:fillRect/>
+                </a:stretch>
+              </a:blipFill>
+            </p:spPr>
+            <p:txBody>
+              <a:bodyPr/>
+              <a:lstStyle/>
+              <a:p>
+                <a:r>
+                  <a:rPr lang="en-US">
+                    <a:noFill/>
+                  </a:rPr>
+                  <a:t> </a:t>
+                </a:r>
+              </a:p>
+            </p:txBody>
+          </p:sp>
+        </mc:Fallback>
+      </mc:AlternateContent>
+      <mc:AlternateContent xmlns:mc="http://schemas.openxmlformats.org/markup-compatibility/2006">
+        <mc:Choice xmlns:a14="http://schemas.microsoft.com/office/drawing/2010/main" Requires="a14">
+          <p:sp>
+            <p:nvSpPr>
+              <p:cNvPr id="10" name="TextBox 9"/>
+              <p:cNvSpPr txBox="1"/>
+              <p:nvPr/>
+            </p:nvSpPr>
+            <p:spPr>
+              <a:xfrm>
+                <a:off x="554295" y="2752725"/>
+                <a:ext cx="3365921" cy="1585627"/>
+              </a:xfrm>
+              <a:prstGeom prst="rect">
+                <a:avLst/>
+              </a:prstGeom>
+              <a:noFill/>
+            </p:spPr>
+            <p:txBody>
+              <a:bodyPr wrap="none" rtlCol="0">
+                <a:spAutoFit/>
+              </a:bodyPr>
+              <a:lstStyle/>
+              <a:p>
+                <a14:m>
+                  <m:oMathPara xmlns:m="http://schemas.openxmlformats.org/officeDocument/2006/math">
+                    <m:oMathParaPr>
+                      <m:jc m:val="centerGroup"/>
+                    </m:oMathParaPr>
+                    <m:oMath xmlns:m="http://schemas.openxmlformats.org/officeDocument/2006/math">
+                      <m:r>
+                        <a:rPr lang="en-US" sz="4000" b="1" smtClean="0">
+                          <a:solidFill>
+                            <a:srgbClr val="92D050"/>
+                          </a:solidFill>
+                          <a:latin typeface="Cambria Math" panose="02040503050406030204" pitchFamily="18" charset="0"/>
+                        </a:rPr>
+                        <m:t>𝚿</m:t>
+                      </m:r>
+                      <m:r>
+                        <a:rPr lang="en-US" sz="4000" b="1" i="1" smtClean="0">
+                          <a:solidFill>
+                            <a:srgbClr val="92D050"/>
+                          </a:solidFill>
+                          <a:latin typeface="Cambria Math" panose="02040503050406030204" pitchFamily="18" charset="0"/>
+                        </a:rPr>
+                        <m:t>=</m:t>
+                      </m:r>
+                      <m:nary>
+                        <m:naryPr>
+                          <m:chr m:val="∑"/>
+                          <m:supHide m:val="on"/>
+                          <m:ctrlPr>
+                            <a:rPr lang="en-US" sz="4000" b="1" i="1" smtClean="0">
+                              <a:solidFill>
+                                <a:srgbClr val="92D050"/>
+                              </a:solidFill>
+                              <a:latin typeface="Cambria Math" panose="02040503050406030204" pitchFamily="18" charset="0"/>
+                            </a:rPr>
+                          </m:ctrlPr>
+                        </m:naryPr>
+                        <m:sub>
+                          <m:r>
+                            <a:rPr lang="en-US" sz="4000" b="1" i="1" smtClean="0">
+                              <a:solidFill>
+                                <a:srgbClr val="92D050"/>
+                              </a:solidFill>
+                              <a:latin typeface="Cambria Math" panose="02040503050406030204" pitchFamily="18" charset="0"/>
+                            </a:rPr>
+                            <m:t>𝒏</m:t>
+                          </m:r>
+                        </m:sub>
+                        <m:sup/>
+                        <m:e>
+                          <m:sSub>
+                            <m:sSubPr>
+                              <m:ctrlPr>
+                                <a:rPr lang="en-US" sz="4000" b="1" i="1" smtClean="0">
+                                  <a:solidFill>
+                                    <a:srgbClr val="92D050"/>
+                                  </a:solidFill>
+                                  <a:latin typeface="Cambria Math" panose="02040503050406030204" pitchFamily="18" charset="0"/>
+                                </a:rPr>
+                              </m:ctrlPr>
+                            </m:sSubPr>
+                            <m:e>
+                              <m:r>
+                                <a:rPr lang="en-US" sz="4000" b="1" i="1" smtClean="0">
+                                  <a:solidFill>
+                                    <a:srgbClr val="92D050"/>
+                                  </a:solidFill>
+                                  <a:latin typeface="Cambria Math" panose="02040503050406030204" pitchFamily="18" charset="0"/>
+                                </a:rPr>
+                                <m:t>𝒄</m:t>
+                              </m:r>
+                            </m:e>
+                            <m:sub>
+                              <m:r>
+                                <a:rPr lang="en-US" sz="4000" b="1" i="1" smtClean="0">
+                                  <a:solidFill>
+                                    <a:srgbClr val="92D050"/>
+                                  </a:solidFill>
+                                  <a:latin typeface="Cambria Math" panose="02040503050406030204" pitchFamily="18" charset="0"/>
+                                </a:rPr>
+                                <m:t>𝒏</m:t>
+                              </m:r>
+                            </m:sub>
+                          </m:sSub>
+                          <m:d>
+                            <m:dPr>
+                              <m:begChr m:val=""/>
+                              <m:endChr m:val="⟩"/>
+                              <m:ctrlPr>
+                                <a:rPr lang="en-US" sz="4000" b="1" i="1" smtClean="0">
+                                  <a:solidFill>
+                                    <a:srgbClr val="92D050"/>
+                                  </a:solidFill>
+                                  <a:latin typeface="Cambria Math" panose="02040503050406030204" pitchFamily="18" charset="0"/>
+                                </a:rPr>
+                              </m:ctrlPr>
+                            </m:dPr>
+                            <m:e>
+                              <m:r>
+                                <a:rPr lang="en-US" sz="4000" b="1" i="1" smtClean="0">
+                                  <a:solidFill>
+                                    <a:srgbClr val="92D050"/>
+                                  </a:solidFill>
+                                  <a:latin typeface="Cambria Math" panose="02040503050406030204" pitchFamily="18" charset="0"/>
+                                </a:rPr>
+                                <m:t>|</m:t>
+                              </m:r>
+                              <m:r>
+                                <a:rPr lang="en-US" sz="4000" b="1" i="1" smtClean="0">
+                                  <a:solidFill>
+                                    <a:srgbClr val="92D050"/>
+                                  </a:solidFill>
+                                  <a:latin typeface="Cambria Math" panose="02040503050406030204" pitchFamily="18" charset="0"/>
+                                </a:rPr>
+                                <m:t>𝒏</m:t>
+                              </m:r>
+                            </m:e>
+                          </m:d>
+                        </m:e>
+                      </m:nary>
+                    </m:oMath>
+                  </m:oMathPara>
+                </a14:m>
+                <a:endParaRPr lang="en-US" sz="4000" b="1" dirty="0">
+                  <a:solidFill>
+                    <a:srgbClr val="92D050"/>
+                  </a:solidFill>
+                </a:endParaRPr>
+              </a:p>
+            </p:txBody>
+          </p:sp>
+        </mc:Choice>
+        <mc:Fallback>
+          <p:sp>
+            <p:nvSpPr>
+              <p:cNvPr id="10" name="TextBox 9"/>
+              <p:cNvSpPr txBox="1">
+                <a:spLocks noRot="1" noChangeAspect="1" noMove="1" noResize="1" noEditPoints="1" noAdjustHandles="1" noChangeArrowheads="1" noChangeShapeType="1" noTextEdit="1"/>
+              </p:cNvSpPr>
+              <p:nvPr/>
+            </p:nvSpPr>
+            <p:spPr>
+              <a:xfrm>
+                <a:off x="554295" y="2752725"/>
+                <a:ext cx="3365921" cy="1585627"/>
+              </a:xfrm>
+              <a:prstGeom prst="rect">
+                <a:avLst/>
+              </a:prstGeom>
+              <a:blipFill>
+                <a:blip r:embed="rId4"/>
+                <a:stretch>
+                  <a:fillRect/>
+                </a:stretch>
+              </a:blipFill>
+            </p:spPr>
+            <p:txBody>
+              <a:bodyPr/>
+              <a:lstStyle/>
+              <a:p>
+                <a:r>
+                  <a:rPr lang="en-US">
+                    <a:noFill/>
+                  </a:rPr>
+                  <a:t> </a:t>
+                </a:r>
+              </a:p>
+            </p:txBody>
+          </p:sp>
+        </mc:Fallback>
+      </mc:AlternateContent>
     </p:spTree>
     <p:extLst>
       <p:ext uri="{BB962C8B-B14F-4D97-AF65-F5344CB8AC3E}">

</xml_diff>